<commit_message>
Updated the slides with the 'what is' information
</commit_message>
<xml_diff>
--- a/slides/SignalRAllTheThings.pptx
+++ b/slides/SignalRAllTheThings.pptx
@@ -6,10 +6,10 @@
     <p:sldMasterId id="2147483656" r:id="rId2"/>
   </p:sldMasterIdLst>
   <p:notesMasterIdLst>
-    <p:notesMasterId r:id="rId10"/>
+    <p:notesMasterId r:id="rId13"/>
   </p:notesMasterIdLst>
   <p:handoutMasterIdLst>
-    <p:handoutMasterId r:id="rId11"/>
+    <p:handoutMasterId r:id="rId14"/>
   </p:handoutMasterIdLst>
   <p:sldIdLst>
     <p:sldId id="676" r:id="rId3"/>
@@ -17,13 +17,16 @@
     <p:sldId id="677" r:id="rId5"/>
     <p:sldId id="701" r:id="rId6"/>
     <p:sldId id="704" r:id="rId7"/>
-    <p:sldId id="702" r:id="rId8"/>
-    <p:sldId id="696" r:id="rId9"/>
+    <p:sldId id="705" r:id="rId8"/>
+    <p:sldId id="706" r:id="rId9"/>
+    <p:sldId id="707" r:id="rId10"/>
+    <p:sldId id="702" r:id="rId11"/>
+    <p:sldId id="696" r:id="rId12"/>
   </p:sldIdLst>
   <p:sldSz cx="9144000" cy="5143500" type="screen16x9"/>
   <p:notesSz cx="9601200" cy="7315200"/>
   <p:custDataLst>
-    <p:tags r:id="rId12"/>
+    <p:tags r:id="rId15"/>
   </p:custDataLst>
   <p:defaultTextStyle>
     <a:defPPr>
@@ -278,7 +281,7 @@
               <a:pPr>
                 <a:defRPr/>
               </a:pPr>
-              <a:t>2/3/2014 9:32 PM</a:t>
+              <a:t>2/5/2014 9:39 PM</a:t>
             </a:fld>
             <a:endParaRPr lang="en-US"/>
           </a:p>
@@ -493,7 +496,7 @@
               <a:pPr>
                 <a:defRPr/>
               </a:pPr>
-              <a:t>2/3/2014 9:32 PM</a:t>
+              <a:t>2/5/2014 9:39 PM</a:t>
             </a:fld>
             <a:endParaRPr lang="en-US"/>
           </a:p>
@@ -898,7 +901,7 @@
             <a:fld id="{645EDAD1-88E4-4536-AD95-0BFD82EC77E6}" type="datetime8">
               <a:rPr lang="en-US" smtClean="0"/>
               <a:pPr/>
-              <a:t>2/3/2014 9:32 PM</a:t>
+              <a:t>2/5/2014 9:39 PM</a:t>
             </a:fld>
             <a:endParaRPr lang="en-US" smtClean="0"/>
           </a:p>
@@ -6793,6 +6796,95 @@
 </p:sld>
 </file>
 
+<file path=ppt/slides/slide10.xml><?xml version="1.0" encoding="utf-8"?>
+<p:sld xmlns:a="http://schemas.openxmlformats.org/drawingml/2006/main" xmlns:r="http://schemas.openxmlformats.org/officeDocument/2006/relationships" xmlns:p="http://schemas.openxmlformats.org/presentationml/2006/main">
+  <p:cSld>
+    <p:spTree>
+      <p:nvGrpSpPr>
+        <p:cNvPr id="1" name=""/>
+        <p:cNvGrpSpPr/>
+        <p:nvPr/>
+      </p:nvGrpSpPr>
+      <p:grpSpPr>
+        <a:xfrm>
+          <a:off x="0" y="0"/>
+          <a:ext cx="0" cy="0"/>
+          <a:chOff x="0" y="0"/>
+          <a:chExt cx="0" cy="0"/>
+        </a:xfrm>
+      </p:grpSpPr>
+      <p:sp>
+        <p:nvSpPr>
+          <p:cNvPr id="2" name="Title 1"/>
+          <p:cNvSpPr>
+            <a:spLocks noGrp="1"/>
+          </p:cNvSpPr>
+          <p:nvPr>
+            <p:ph type="title"/>
+          </p:nvPr>
+        </p:nvSpPr>
+        <p:spPr/>
+        <p:txBody>
+          <a:bodyPr/>
+          <a:lstStyle/>
+          <a:p>
+            <a:r>
+              <a:rPr lang="en-US" b="1" dirty="0" smtClean="0"/>
+              <a:t>Thanks!</a:t>
+            </a:r>
+            <a:endParaRPr lang="en-US" b="1" dirty="0"/>
+          </a:p>
+        </p:txBody>
+      </p:sp>
+      <p:sp>
+        <p:nvSpPr>
+          <p:cNvPr id="3" name="Content Placeholder 2"/>
+          <p:cNvSpPr>
+            <a:spLocks noGrp="1"/>
+          </p:cNvSpPr>
+          <p:nvPr>
+            <p:ph idx="1"/>
+          </p:nvPr>
+        </p:nvSpPr>
+        <p:spPr>
+          <a:xfrm>
+            <a:off x="381003" y="2370926"/>
+            <a:ext cx="8410575" cy="769441"/>
+          </a:xfrm>
+        </p:spPr>
+        <p:txBody>
+          <a:bodyPr/>
+          <a:lstStyle/>
+          <a:p>
+            <a:pPr algn="ctr">
+              <a:buNone/>
+            </a:pPr>
+            <a:r>
+              <a:rPr lang="en-US" sz="4800" b="1" dirty="0" smtClean="0"/>
+              <a:t>Questions?</a:t>
+            </a:r>
+            <a:endParaRPr lang="en-US" sz="2800" b="1" dirty="0" smtClean="0"/>
+          </a:p>
+        </p:txBody>
+      </p:sp>
+    </p:spTree>
+  </p:cSld>
+  <p:clrMapOvr>
+    <a:masterClrMapping/>
+  </p:clrMapOvr>
+  <p:transition>
+    <p:fade/>
+  </p:transition>
+  <p:timing>
+    <p:tnLst>
+      <p:par>
+        <p:cTn id="1" dur="indefinite" restart="never" nodeType="tmRoot"/>
+      </p:par>
+    </p:tnLst>
+  </p:timing>
+</p:sld>
+</file>
+
 <file path=ppt/slides/slide2.xml><?xml version="1.0" encoding="utf-8"?>
 <p:sld xmlns:a="http://schemas.openxmlformats.org/drawingml/2006/main" xmlns:r="http://schemas.openxmlformats.org/officeDocument/2006/relationships" xmlns:p="http://schemas.openxmlformats.org/presentationml/2006/main">
   <p:cSld>
@@ -6989,14 +7081,12 @@
               <a:rPr lang="en-US" dirty="0" smtClean="0"/>
               <a:t>?</a:t>
             </a:r>
-            <a:endParaRPr lang="en-US" dirty="0" smtClean="0"/>
           </a:p>
           <a:p>
             <a:r>
               <a:rPr lang="en-US" dirty="0" smtClean="0"/>
               <a:t>Demos, Demos, Demos!</a:t>
             </a:r>
-            <a:endParaRPr lang="en-US" dirty="0" smtClean="0"/>
           </a:p>
         </p:txBody>
       </p:sp>
@@ -7101,13 +7191,8 @@
             </a:pPr>
             <a:r>
               <a:rPr lang="en-US" b="1" dirty="0" smtClean="0"/>
-              <a:t>http</a:t>
-            </a:r>
-            <a:r>
-              <a:rPr lang="en-US" b="1" dirty="0" smtClean="0"/>
-              <a:t>://jglozano.io</a:t>
-            </a:r>
-            <a:endParaRPr lang="en-US" b="1" dirty="0" smtClean="0"/>
+              <a:t>http://jglozano.io</a:t>
+            </a:r>
           </a:p>
         </p:txBody>
       </p:sp>
@@ -7444,7 +7529,15 @@
           <a:p>
             <a:r>
               <a:rPr lang="en-US" b="1" dirty="0" smtClean="0"/>
-              <a:t>Demo</a:t>
+              <a:t>What is </a:t>
+            </a:r>
+            <a:r>
+              <a:rPr lang="en-US" b="1" dirty="0" err="1" smtClean="0"/>
+              <a:t>SignalR</a:t>
+            </a:r>
+            <a:r>
+              <a:rPr lang="en-US" b="1" dirty="0" smtClean="0"/>
+              <a:t>?</a:t>
             </a:r>
             <a:endParaRPr lang="en-US" b="1" dirty="0"/>
           </a:p>
@@ -7452,39 +7545,349 @@
       </p:sp>
       <p:sp>
         <p:nvSpPr>
-          <p:cNvPr id="3" name="Content Placeholder 2"/>
-          <p:cNvSpPr>
-            <a:spLocks noGrp="1"/>
-          </p:cNvSpPr>
-          <p:nvPr>
-            <p:ph idx="1"/>
-          </p:nvPr>
-        </p:nvSpPr>
-        <p:spPr>
+          <p:cNvPr id="5" name="Content Placeholder 2"/>
+          <p:cNvSpPr txBox="1">
+            <a:spLocks/>
+          </p:cNvSpPr>
+          <p:nvPr/>
+        </p:nvSpPr>
+        <p:spPr bwMode="auto">
           <a:xfrm>
-            <a:off x="366714" y="2283210"/>
-            <a:ext cx="8410575" cy="769441"/>
+            <a:off x="381003" y="1063228"/>
+            <a:ext cx="8410575" cy="2677656"/>
           </a:xfrm>
-        </p:spPr>
-        <p:txBody>
-          <a:bodyPr/>
-          <a:lstStyle/>
-          <a:p>
-            <a:pPr algn="ctr">
+          <a:prstGeom prst="rect">
+            <a:avLst/>
+          </a:prstGeom>
+          <a:noFill/>
+          <a:ln w="9525">
+            <a:noFill/>
+            <a:miter lim="800000"/>
+            <a:headEnd/>
+            <a:tailEnd/>
+          </a:ln>
+          <a:effectLst/>
+        </p:spPr>
+        <p:txBody>
+          <a:bodyPr vert="horz" wrap="square" lIns="91440" tIns="45720" rIns="91440" bIns="45720" numCol="1" anchor="t" anchorCtr="0" compatLnSpc="1">
+            <a:prstTxWarp prst="textNoShape">
+              <a:avLst/>
+            </a:prstTxWarp>
+            <a:spAutoFit/>
+          </a:bodyPr>
+          <a:lstStyle>
+            <a:lvl1pPr marL="461963" indent="-461963" algn="l" rtl="0" eaLnBrk="1" fontAlgn="base" hangingPunct="1">
+              <a:lnSpc>
+                <a:spcPct val="90000"/>
+              </a:lnSpc>
+              <a:spcBef>
+                <a:spcPct val="30000"/>
+              </a:spcBef>
+              <a:spcAft>
+                <a:spcPct val="0"/>
+              </a:spcAft>
+              <a:buClr>
+                <a:schemeClr val="tx2"/>
+              </a:buClr>
+              <a:buFont typeface="Wingdings 2" pitchFamily="18" charset="2"/>
+              <a:buBlip>
+                <a:blip r:embed="rId2"/>
+              </a:buBlip>
+              <a:defRPr sz="3200">
+                <a:solidFill>
+                  <a:schemeClr val="tx1"/>
+                </a:solidFill>
+                <a:effectLst>
+                  <a:outerShdw blurRad="38100" dist="38100" dir="2700000" algn="tl">
+                    <a:srgbClr val="000000"/>
+                  </a:outerShdw>
+                </a:effectLst>
+                <a:latin typeface="+mn-lt"/>
+                <a:ea typeface="+mn-ea"/>
+                <a:cs typeface="+mn-cs"/>
+              </a:defRPr>
+            </a:lvl1pPr>
+            <a:lvl2pPr marL="850900" indent="-387350" algn="l" rtl="0" eaLnBrk="1" fontAlgn="base" hangingPunct="1">
+              <a:lnSpc>
+                <a:spcPct val="90000"/>
+              </a:lnSpc>
+              <a:spcBef>
+                <a:spcPct val="30000"/>
+              </a:spcBef>
+              <a:spcAft>
+                <a:spcPct val="0"/>
+              </a:spcAft>
+              <a:buClr>
+                <a:schemeClr val="tx2"/>
+              </a:buClr>
+              <a:buSzPct val="75000"/>
+              <a:buFont typeface="Wingdings 2" pitchFamily="18" charset="2"/>
+              <a:buBlip>
+                <a:blip r:embed="rId3"/>
+              </a:buBlip>
+              <a:defRPr sz="2800">
+                <a:solidFill>
+                  <a:schemeClr val="tx1"/>
+                </a:solidFill>
+                <a:effectLst>
+                  <a:outerShdw blurRad="38100" dist="38100" dir="2700000" algn="tl">
+                    <a:srgbClr val="000000"/>
+                  </a:outerShdw>
+                </a:effectLst>
+                <a:latin typeface="+mn-lt"/>
+              </a:defRPr>
+            </a:lvl2pPr>
+            <a:lvl3pPr marL="1257300" indent="-404813" algn="l" rtl="0" eaLnBrk="1" fontAlgn="base" hangingPunct="1">
+              <a:lnSpc>
+                <a:spcPct val="90000"/>
+              </a:lnSpc>
+              <a:spcBef>
+                <a:spcPct val="30000"/>
+              </a:spcBef>
+              <a:spcAft>
+                <a:spcPct val="0"/>
+              </a:spcAft>
+              <a:buClr>
+                <a:schemeClr val="tx2"/>
+              </a:buClr>
+              <a:buSzPct val="75000"/>
+              <a:buFont typeface="Wingdings 2" pitchFamily="18" charset="2"/>
+              <a:buBlip>
+                <a:blip r:embed="rId3"/>
+              </a:buBlip>
+              <a:defRPr sz="2400">
+                <a:solidFill>
+                  <a:schemeClr val="tx1"/>
+                </a:solidFill>
+                <a:effectLst>
+                  <a:outerShdw blurRad="38100" dist="38100" dir="2700000" algn="tl">
+                    <a:srgbClr val="000000"/>
+                  </a:outerShdw>
+                </a:effectLst>
+                <a:latin typeface="+mn-lt"/>
+              </a:defRPr>
+            </a:lvl3pPr>
+            <a:lvl4pPr marL="1655763" indent="-396875" algn="l" rtl="0" eaLnBrk="1" fontAlgn="base" hangingPunct="1">
+              <a:lnSpc>
+                <a:spcPct val="90000"/>
+              </a:lnSpc>
+              <a:spcBef>
+                <a:spcPct val="30000"/>
+              </a:spcBef>
+              <a:spcAft>
+                <a:spcPct val="0"/>
+              </a:spcAft>
+              <a:buClr>
+                <a:schemeClr val="tx2"/>
+              </a:buClr>
+              <a:buSzPct val="75000"/>
+              <a:buFont typeface="Wingdings 2" pitchFamily="18" charset="2"/>
+              <a:buBlip>
+                <a:blip r:embed="rId3"/>
+              </a:buBlip>
+              <a:defRPr sz="2000">
+                <a:solidFill>
+                  <a:schemeClr val="tx1"/>
+                </a:solidFill>
+                <a:effectLst>
+                  <a:outerShdw blurRad="38100" dist="38100" dir="2700000" algn="tl">
+                    <a:srgbClr val="000000"/>
+                  </a:outerShdw>
+                </a:effectLst>
+                <a:latin typeface="+mn-lt"/>
+              </a:defRPr>
+            </a:lvl4pPr>
+            <a:lvl5pPr marL="2052638" indent="-395288" algn="l" rtl="0" eaLnBrk="1" fontAlgn="base" hangingPunct="1">
+              <a:lnSpc>
+                <a:spcPct val="90000"/>
+              </a:lnSpc>
+              <a:spcBef>
+                <a:spcPct val="30000"/>
+              </a:spcBef>
+              <a:spcAft>
+                <a:spcPct val="0"/>
+              </a:spcAft>
+              <a:buClr>
+                <a:schemeClr val="tx2"/>
+              </a:buClr>
+              <a:buSzPct val="75000"/>
+              <a:buFont typeface="Wingdings 2" pitchFamily="18" charset="2"/>
+              <a:buBlip>
+                <a:blip r:embed="rId3"/>
+              </a:buBlip>
+              <a:defRPr sz="2000">
+                <a:solidFill>
+                  <a:schemeClr val="tx1"/>
+                </a:solidFill>
+                <a:effectLst>
+                  <a:outerShdw blurRad="38100" dist="38100" dir="2700000" algn="tl">
+                    <a:srgbClr val="000000"/>
+                  </a:outerShdw>
+                </a:effectLst>
+                <a:latin typeface="+mn-lt"/>
+              </a:defRPr>
+            </a:lvl5pPr>
+            <a:lvl6pPr marL="2509838" indent="-395288" algn="l" rtl="0" eaLnBrk="1" fontAlgn="base" hangingPunct="1">
+              <a:lnSpc>
+                <a:spcPct val="90000"/>
+              </a:lnSpc>
+              <a:spcBef>
+                <a:spcPct val="30000"/>
+              </a:spcBef>
+              <a:spcAft>
+                <a:spcPct val="0"/>
+              </a:spcAft>
+              <a:buClr>
+                <a:schemeClr val="tx2"/>
+              </a:buClr>
+              <a:buSzPct val="75000"/>
+              <a:buFont typeface="Wingdings 2" pitchFamily="18" charset="2"/>
+              <a:buBlip>
+                <a:blip r:embed="rId3"/>
+              </a:buBlip>
+              <a:defRPr sz="2000">
+                <a:solidFill>
+                  <a:schemeClr val="tx1"/>
+                </a:solidFill>
+                <a:effectLst>
+                  <a:outerShdw blurRad="38100" dist="38100" dir="2700000" algn="tl">
+                    <a:srgbClr val="000000"/>
+                  </a:outerShdw>
+                </a:effectLst>
+                <a:latin typeface="+mn-lt"/>
+              </a:defRPr>
+            </a:lvl6pPr>
+            <a:lvl7pPr marL="2967038" indent="-395288" algn="l" rtl="0" eaLnBrk="1" fontAlgn="base" hangingPunct="1">
+              <a:lnSpc>
+                <a:spcPct val="90000"/>
+              </a:lnSpc>
+              <a:spcBef>
+                <a:spcPct val="30000"/>
+              </a:spcBef>
+              <a:spcAft>
+                <a:spcPct val="0"/>
+              </a:spcAft>
+              <a:buClr>
+                <a:schemeClr val="tx2"/>
+              </a:buClr>
+              <a:buSzPct val="75000"/>
+              <a:buFont typeface="Wingdings 2" pitchFamily="18" charset="2"/>
+              <a:buBlip>
+                <a:blip r:embed="rId3"/>
+              </a:buBlip>
+              <a:defRPr sz="2000">
+                <a:solidFill>
+                  <a:schemeClr val="tx1"/>
+                </a:solidFill>
+                <a:effectLst>
+                  <a:outerShdw blurRad="38100" dist="38100" dir="2700000" algn="tl">
+                    <a:srgbClr val="000000"/>
+                  </a:outerShdw>
+                </a:effectLst>
+                <a:latin typeface="+mn-lt"/>
+              </a:defRPr>
+            </a:lvl7pPr>
+            <a:lvl8pPr marL="3424238" indent="-395288" algn="l" rtl="0" eaLnBrk="1" fontAlgn="base" hangingPunct="1">
+              <a:lnSpc>
+                <a:spcPct val="90000"/>
+              </a:lnSpc>
+              <a:spcBef>
+                <a:spcPct val="30000"/>
+              </a:spcBef>
+              <a:spcAft>
+                <a:spcPct val="0"/>
+              </a:spcAft>
+              <a:buClr>
+                <a:schemeClr val="tx2"/>
+              </a:buClr>
+              <a:buSzPct val="75000"/>
+              <a:buFont typeface="Wingdings 2" pitchFamily="18" charset="2"/>
+              <a:buBlip>
+                <a:blip r:embed="rId3"/>
+              </a:buBlip>
+              <a:defRPr sz="2000">
+                <a:solidFill>
+                  <a:schemeClr val="tx1"/>
+                </a:solidFill>
+                <a:effectLst>
+                  <a:outerShdw blurRad="38100" dist="38100" dir="2700000" algn="tl">
+                    <a:srgbClr val="000000"/>
+                  </a:outerShdw>
+                </a:effectLst>
+                <a:latin typeface="+mn-lt"/>
+              </a:defRPr>
+            </a:lvl8pPr>
+            <a:lvl9pPr marL="3881438" indent="-395288" algn="l" rtl="0" eaLnBrk="1" fontAlgn="base" hangingPunct="1">
+              <a:lnSpc>
+                <a:spcPct val="90000"/>
+              </a:lnSpc>
+              <a:spcBef>
+                <a:spcPct val="30000"/>
+              </a:spcBef>
+              <a:spcAft>
+                <a:spcPct val="0"/>
+              </a:spcAft>
+              <a:buClr>
+                <a:schemeClr val="tx2"/>
+              </a:buClr>
+              <a:buSzPct val="75000"/>
+              <a:buFont typeface="Wingdings 2" pitchFamily="18" charset="2"/>
+              <a:buBlip>
+                <a:blip r:embed="rId3"/>
+              </a:buBlip>
+              <a:defRPr sz="2000">
+                <a:solidFill>
+                  <a:schemeClr val="tx1"/>
+                </a:solidFill>
+                <a:effectLst>
+                  <a:outerShdw blurRad="38100" dist="38100" dir="2700000" algn="tl">
+                    <a:srgbClr val="000000"/>
+                  </a:outerShdw>
+                </a:effectLst>
+                <a:latin typeface="+mn-lt"/>
+              </a:defRPr>
+            </a:lvl9pPr>
+          </a:lstStyle>
+          <a:p>
+            <a:r>
+              <a:rPr lang="en-US" kern="0" dirty="0" smtClean="0"/>
+              <a:t>It helps address the issue with…</a:t>
+            </a:r>
+          </a:p>
+          <a:p>
+            <a:pPr lvl="1"/>
+            <a:r>
+              <a:rPr lang="en-US" kern="0" dirty="0" smtClean="0"/>
+              <a:t>Ajax (XHR) Requests</a:t>
+            </a:r>
+          </a:p>
+          <a:p>
+            <a:pPr lvl="1"/>
+            <a:r>
+              <a:rPr lang="en-US" kern="0" dirty="0" smtClean="0"/>
+              <a:t>Polling/Long Polling</a:t>
+            </a:r>
+          </a:p>
+          <a:p>
+            <a:pPr lvl="1"/>
+            <a:r>
+              <a:rPr lang="en-US" kern="0" dirty="0" err="1" smtClean="0"/>
+              <a:t>WebSockets</a:t>
+            </a:r>
+            <a:endParaRPr lang="en-US" kern="0" dirty="0" smtClean="0"/>
+          </a:p>
+          <a:p>
+            <a:pPr marL="0" indent="0">
               <a:buNone/>
             </a:pPr>
-            <a:r>
-              <a:rPr lang="en-US" sz="4800" b="1" dirty="0" smtClean="0"/>
-              <a:t>Enough slides, let’s code.</a:t>
-            </a:r>
-            <a:endParaRPr lang="en-US" sz="2800" b="1" dirty="0" smtClean="0"/>
+            <a:endParaRPr lang="en-US" kern="0" dirty="0" smtClean="0"/>
           </a:p>
         </p:txBody>
       </p:sp>
     </p:spTree>
     <p:extLst>
       <p:ext uri="{BB962C8B-B14F-4D97-AF65-F5344CB8AC3E}">
-        <p14:creationId xmlns:p14="http://schemas.microsoft.com/office/powerpoint/2010/main" val="2921785292"/>
+        <p14:creationId xmlns:p14="http://schemas.microsoft.com/office/powerpoint/2010/main" val="2990580258"/>
       </p:ext>
     </p:extLst>
   </p:cSld>
@@ -7531,14 +7934,27 @@
             <p:ph type="title"/>
           </p:nvPr>
         </p:nvSpPr>
-        <p:spPr/>
+        <p:spPr>
+          <a:xfrm>
+            <a:off x="381000" y="171450"/>
+            <a:ext cx="8382000" cy="769441"/>
+          </a:xfrm>
+        </p:spPr>
         <p:txBody>
           <a:bodyPr/>
           <a:lstStyle/>
           <a:p>
             <a:r>
               <a:rPr lang="en-US" b="1" dirty="0" smtClean="0"/>
-              <a:t>Thanks!</a:t>
+              <a:t>What is </a:t>
+            </a:r>
+            <a:r>
+              <a:rPr lang="en-US" b="1" dirty="0" err="1" smtClean="0"/>
+              <a:t>SignalR</a:t>
+            </a:r>
+            <a:r>
+              <a:rPr lang="en-US" b="1" dirty="0" smtClean="0"/>
+              <a:t>?</a:t>
             </a:r>
             <a:endParaRPr lang="en-US" b="1" dirty="0"/>
           </a:p>
@@ -7546,17 +7962,441 @@
       </p:sp>
       <p:sp>
         <p:nvSpPr>
-          <p:cNvPr id="3" name="Content Placeholder 2"/>
+          <p:cNvPr id="5" name="Content Placeholder 2"/>
+          <p:cNvSpPr txBox="1">
+            <a:spLocks/>
+          </p:cNvSpPr>
+          <p:nvPr/>
+        </p:nvSpPr>
+        <p:spPr bwMode="auto">
+          <a:xfrm>
+            <a:off x="381003" y="1063228"/>
+            <a:ext cx="8410575" cy="3841052"/>
+          </a:xfrm>
+          <a:prstGeom prst="rect">
+            <a:avLst/>
+          </a:prstGeom>
+          <a:noFill/>
+          <a:ln w="9525">
+            <a:noFill/>
+            <a:miter lim="800000"/>
+            <a:headEnd/>
+            <a:tailEnd/>
+          </a:ln>
+          <a:effectLst/>
+        </p:spPr>
+        <p:txBody>
+          <a:bodyPr vert="horz" wrap="square" lIns="91440" tIns="45720" rIns="91440" bIns="45720" numCol="1" anchor="t" anchorCtr="0" compatLnSpc="1">
+            <a:prstTxWarp prst="textNoShape">
+              <a:avLst/>
+            </a:prstTxWarp>
+            <a:spAutoFit/>
+          </a:bodyPr>
+          <a:lstStyle>
+            <a:lvl1pPr marL="461963" indent="-461963" algn="l" rtl="0" eaLnBrk="1" fontAlgn="base" hangingPunct="1">
+              <a:lnSpc>
+                <a:spcPct val="90000"/>
+              </a:lnSpc>
+              <a:spcBef>
+                <a:spcPct val="30000"/>
+              </a:spcBef>
+              <a:spcAft>
+                <a:spcPct val="0"/>
+              </a:spcAft>
+              <a:buClr>
+                <a:schemeClr val="tx2"/>
+              </a:buClr>
+              <a:buFont typeface="Wingdings 2" pitchFamily="18" charset="2"/>
+              <a:buBlip>
+                <a:blip r:embed="rId2"/>
+              </a:buBlip>
+              <a:defRPr sz="3200">
+                <a:solidFill>
+                  <a:schemeClr val="tx1"/>
+                </a:solidFill>
+                <a:effectLst>
+                  <a:outerShdw blurRad="38100" dist="38100" dir="2700000" algn="tl">
+                    <a:srgbClr val="000000"/>
+                  </a:outerShdw>
+                </a:effectLst>
+                <a:latin typeface="+mn-lt"/>
+                <a:ea typeface="+mn-ea"/>
+                <a:cs typeface="+mn-cs"/>
+              </a:defRPr>
+            </a:lvl1pPr>
+            <a:lvl2pPr marL="850900" indent="-387350" algn="l" rtl="0" eaLnBrk="1" fontAlgn="base" hangingPunct="1">
+              <a:lnSpc>
+                <a:spcPct val="90000"/>
+              </a:lnSpc>
+              <a:spcBef>
+                <a:spcPct val="30000"/>
+              </a:spcBef>
+              <a:spcAft>
+                <a:spcPct val="0"/>
+              </a:spcAft>
+              <a:buClr>
+                <a:schemeClr val="tx2"/>
+              </a:buClr>
+              <a:buSzPct val="75000"/>
+              <a:buFont typeface="Wingdings 2" pitchFamily="18" charset="2"/>
+              <a:buBlip>
+                <a:blip r:embed="rId3"/>
+              </a:buBlip>
+              <a:defRPr sz="2800">
+                <a:solidFill>
+                  <a:schemeClr val="tx1"/>
+                </a:solidFill>
+                <a:effectLst>
+                  <a:outerShdw blurRad="38100" dist="38100" dir="2700000" algn="tl">
+                    <a:srgbClr val="000000"/>
+                  </a:outerShdw>
+                </a:effectLst>
+                <a:latin typeface="+mn-lt"/>
+              </a:defRPr>
+            </a:lvl2pPr>
+            <a:lvl3pPr marL="1257300" indent="-404813" algn="l" rtl="0" eaLnBrk="1" fontAlgn="base" hangingPunct="1">
+              <a:lnSpc>
+                <a:spcPct val="90000"/>
+              </a:lnSpc>
+              <a:spcBef>
+                <a:spcPct val="30000"/>
+              </a:spcBef>
+              <a:spcAft>
+                <a:spcPct val="0"/>
+              </a:spcAft>
+              <a:buClr>
+                <a:schemeClr val="tx2"/>
+              </a:buClr>
+              <a:buSzPct val="75000"/>
+              <a:buFont typeface="Wingdings 2" pitchFamily="18" charset="2"/>
+              <a:buBlip>
+                <a:blip r:embed="rId3"/>
+              </a:buBlip>
+              <a:defRPr sz="2400">
+                <a:solidFill>
+                  <a:schemeClr val="tx1"/>
+                </a:solidFill>
+                <a:effectLst>
+                  <a:outerShdw blurRad="38100" dist="38100" dir="2700000" algn="tl">
+                    <a:srgbClr val="000000"/>
+                  </a:outerShdw>
+                </a:effectLst>
+                <a:latin typeface="+mn-lt"/>
+              </a:defRPr>
+            </a:lvl3pPr>
+            <a:lvl4pPr marL="1655763" indent="-396875" algn="l" rtl="0" eaLnBrk="1" fontAlgn="base" hangingPunct="1">
+              <a:lnSpc>
+                <a:spcPct val="90000"/>
+              </a:lnSpc>
+              <a:spcBef>
+                <a:spcPct val="30000"/>
+              </a:spcBef>
+              <a:spcAft>
+                <a:spcPct val="0"/>
+              </a:spcAft>
+              <a:buClr>
+                <a:schemeClr val="tx2"/>
+              </a:buClr>
+              <a:buSzPct val="75000"/>
+              <a:buFont typeface="Wingdings 2" pitchFamily="18" charset="2"/>
+              <a:buBlip>
+                <a:blip r:embed="rId3"/>
+              </a:buBlip>
+              <a:defRPr sz="2000">
+                <a:solidFill>
+                  <a:schemeClr val="tx1"/>
+                </a:solidFill>
+                <a:effectLst>
+                  <a:outerShdw blurRad="38100" dist="38100" dir="2700000" algn="tl">
+                    <a:srgbClr val="000000"/>
+                  </a:outerShdw>
+                </a:effectLst>
+                <a:latin typeface="+mn-lt"/>
+              </a:defRPr>
+            </a:lvl4pPr>
+            <a:lvl5pPr marL="2052638" indent="-395288" algn="l" rtl="0" eaLnBrk="1" fontAlgn="base" hangingPunct="1">
+              <a:lnSpc>
+                <a:spcPct val="90000"/>
+              </a:lnSpc>
+              <a:spcBef>
+                <a:spcPct val="30000"/>
+              </a:spcBef>
+              <a:spcAft>
+                <a:spcPct val="0"/>
+              </a:spcAft>
+              <a:buClr>
+                <a:schemeClr val="tx2"/>
+              </a:buClr>
+              <a:buSzPct val="75000"/>
+              <a:buFont typeface="Wingdings 2" pitchFamily="18" charset="2"/>
+              <a:buBlip>
+                <a:blip r:embed="rId3"/>
+              </a:buBlip>
+              <a:defRPr sz="2000">
+                <a:solidFill>
+                  <a:schemeClr val="tx1"/>
+                </a:solidFill>
+                <a:effectLst>
+                  <a:outerShdw blurRad="38100" dist="38100" dir="2700000" algn="tl">
+                    <a:srgbClr val="000000"/>
+                  </a:outerShdw>
+                </a:effectLst>
+                <a:latin typeface="+mn-lt"/>
+              </a:defRPr>
+            </a:lvl5pPr>
+            <a:lvl6pPr marL="2509838" indent="-395288" algn="l" rtl="0" eaLnBrk="1" fontAlgn="base" hangingPunct="1">
+              <a:lnSpc>
+                <a:spcPct val="90000"/>
+              </a:lnSpc>
+              <a:spcBef>
+                <a:spcPct val="30000"/>
+              </a:spcBef>
+              <a:spcAft>
+                <a:spcPct val="0"/>
+              </a:spcAft>
+              <a:buClr>
+                <a:schemeClr val="tx2"/>
+              </a:buClr>
+              <a:buSzPct val="75000"/>
+              <a:buFont typeface="Wingdings 2" pitchFamily="18" charset="2"/>
+              <a:buBlip>
+                <a:blip r:embed="rId3"/>
+              </a:buBlip>
+              <a:defRPr sz="2000">
+                <a:solidFill>
+                  <a:schemeClr val="tx1"/>
+                </a:solidFill>
+                <a:effectLst>
+                  <a:outerShdw blurRad="38100" dist="38100" dir="2700000" algn="tl">
+                    <a:srgbClr val="000000"/>
+                  </a:outerShdw>
+                </a:effectLst>
+                <a:latin typeface="+mn-lt"/>
+              </a:defRPr>
+            </a:lvl6pPr>
+            <a:lvl7pPr marL="2967038" indent="-395288" algn="l" rtl="0" eaLnBrk="1" fontAlgn="base" hangingPunct="1">
+              <a:lnSpc>
+                <a:spcPct val="90000"/>
+              </a:lnSpc>
+              <a:spcBef>
+                <a:spcPct val="30000"/>
+              </a:spcBef>
+              <a:spcAft>
+                <a:spcPct val="0"/>
+              </a:spcAft>
+              <a:buClr>
+                <a:schemeClr val="tx2"/>
+              </a:buClr>
+              <a:buSzPct val="75000"/>
+              <a:buFont typeface="Wingdings 2" pitchFamily="18" charset="2"/>
+              <a:buBlip>
+                <a:blip r:embed="rId3"/>
+              </a:buBlip>
+              <a:defRPr sz="2000">
+                <a:solidFill>
+                  <a:schemeClr val="tx1"/>
+                </a:solidFill>
+                <a:effectLst>
+                  <a:outerShdw blurRad="38100" dist="38100" dir="2700000" algn="tl">
+                    <a:srgbClr val="000000"/>
+                  </a:outerShdw>
+                </a:effectLst>
+                <a:latin typeface="+mn-lt"/>
+              </a:defRPr>
+            </a:lvl7pPr>
+            <a:lvl8pPr marL="3424238" indent="-395288" algn="l" rtl="0" eaLnBrk="1" fontAlgn="base" hangingPunct="1">
+              <a:lnSpc>
+                <a:spcPct val="90000"/>
+              </a:lnSpc>
+              <a:spcBef>
+                <a:spcPct val="30000"/>
+              </a:spcBef>
+              <a:spcAft>
+                <a:spcPct val="0"/>
+              </a:spcAft>
+              <a:buClr>
+                <a:schemeClr val="tx2"/>
+              </a:buClr>
+              <a:buSzPct val="75000"/>
+              <a:buFont typeface="Wingdings 2" pitchFamily="18" charset="2"/>
+              <a:buBlip>
+                <a:blip r:embed="rId3"/>
+              </a:buBlip>
+              <a:defRPr sz="2000">
+                <a:solidFill>
+                  <a:schemeClr val="tx1"/>
+                </a:solidFill>
+                <a:effectLst>
+                  <a:outerShdw blurRad="38100" dist="38100" dir="2700000" algn="tl">
+                    <a:srgbClr val="000000"/>
+                  </a:outerShdw>
+                </a:effectLst>
+                <a:latin typeface="+mn-lt"/>
+              </a:defRPr>
+            </a:lvl8pPr>
+            <a:lvl9pPr marL="3881438" indent="-395288" algn="l" rtl="0" eaLnBrk="1" fontAlgn="base" hangingPunct="1">
+              <a:lnSpc>
+                <a:spcPct val="90000"/>
+              </a:lnSpc>
+              <a:spcBef>
+                <a:spcPct val="30000"/>
+              </a:spcBef>
+              <a:spcAft>
+                <a:spcPct val="0"/>
+              </a:spcAft>
+              <a:buClr>
+                <a:schemeClr val="tx2"/>
+              </a:buClr>
+              <a:buSzPct val="75000"/>
+              <a:buFont typeface="Wingdings 2" pitchFamily="18" charset="2"/>
+              <a:buBlip>
+                <a:blip r:embed="rId3"/>
+              </a:buBlip>
+              <a:defRPr sz="2000">
+                <a:solidFill>
+                  <a:schemeClr val="tx1"/>
+                </a:solidFill>
+                <a:effectLst>
+                  <a:outerShdw blurRad="38100" dist="38100" dir="2700000" algn="tl">
+                    <a:srgbClr val="000000"/>
+                  </a:outerShdw>
+                </a:effectLst>
+                <a:latin typeface="+mn-lt"/>
+              </a:defRPr>
+            </a:lvl9pPr>
+          </a:lstStyle>
+          <a:p>
+            <a:r>
+              <a:rPr lang="en-US" kern="0" dirty="0" smtClean="0"/>
+              <a:t>It provides…</a:t>
+            </a:r>
+          </a:p>
+          <a:p>
+            <a:pPr lvl="1"/>
+            <a:r>
+              <a:rPr lang="en-US" kern="0" dirty="0" smtClean="0"/>
+              <a:t>Abstraction from </a:t>
+            </a:r>
+            <a:r>
+              <a:rPr lang="en-US" kern="0" dirty="0" err="1" smtClean="0"/>
+              <a:t>SysWeb</a:t>
+            </a:r>
+            <a:r>
+              <a:rPr lang="en-US" kern="0" dirty="0" smtClean="0"/>
+              <a:t> via Open Web Interface for .NET (OWIN)</a:t>
+            </a:r>
+          </a:p>
+          <a:p>
+            <a:pPr lvl="1"/>
+            <a:r>
+              <a:rPr lang="en-US" kern="0" dirty="0" smtClean="0"/>
+              <a:t>One implementation that leverages previous approaches</a:t>
+            </a:r>
+          </a:p>
+          <a:p>
+            <a:pPr lvl="1"/>
+            <a:r>
+              <a:rPr lang="en-US" kern="0" dirty="0" smtClean="0"/>
+              <a:t>Simple consumer interface, great extension points</a:t>
+            </a:r>
+          </a:p>
+          <a:p>
+            <a:pPr marL="0" indent="0">
+              <a:buNone/>
+            </a:pPr>
+            <a:endParaRPr lang="en-US" kern="0" dirty="0" smtClean="0"/>
+          </a:p>
+        </p:txBody>
+      </p:sp>
+    </p:spTree>
+    <p:extLst>
+      <p:ext uri="{BB962C8B-B14F-4D97-AF65-F5344CB8AC3E}">
+        <p14:creationId xmlns:p14="http://schemas.microsoft.com/office/powerpoint/2010/main" val="1934845036"/>
+      </p:ext>
+    </p:extLst>
+  </p:cSld>
+  <p:clrMapOvr>
+    <a:masterClrMapping/>
+  </p:clrMapOvr>
+  <p:transition>
+    <p:fade/>
+  </p:transition>
+  <p:timing>
+    <p:tnLst>
+      <p:par>
+        <p:cTn id="1" dur="indefinite" restart="never" nodeType="tmRoot"/>
+      </p:par>
+    </p:tnLst>
+  </p:timing>
+</p:sld>
+</file>
+
+<file path=ppt/slides/slide8.xml><?xml version="1.0" encoding="utf-8"?>
+<p:sld xmlns:a="http://schemas.openxmlformats.org/drawingml/2006/main" xmlns:r="http://schemas.openxmlformats.org/officeDocument/2006/relationships" xmlns:p="http://schemas.openxmlformats.org/presentationml/2006/main">
+  <p:cSld>
+    <p:spTree>
+      <p:nvGrpSpPr>
+        <p:cNvPr id="1" name=""/>
+        <p:cNvGrpSpPr/>
+        <p:nvPr/>
+      </p:nvGrpSpPr>
+      <p:grpSpPr>
+        <a:xfrm>
+          <a:off x="0" y="0"/>
+          <a:ext cx="0" cy="0"/>
+          <a:chOff x="0" y="0"/>
+          <a:chExt cx="0" cy="0"/>
+        </a:xfrm>
+      </p:grpSpPr>
+      <p:sp>
+        <p:nvSpPr>
+          <p:cNvPr id="2" name="Title 1"/>
           <p:cNvSpPr>
             <a:spLocks noGrp="1"/>
           </p:cNvSpPr>
           <p:nvPr>
-            <p:ph idx="1"/>
+            <p:ph type="title"/>
           </p:nvPr>
         </p:nvSpPr>
         <p:spPr>
           <a:xfrm>
-            <a:off x="381003" y="2370926"/>
+            <a:off x="381000" y="171450"/>
+            <a:ext cx="8382000" cy="769441"/>
+          </a:xfrm>
+        </p:spPr>
+        <p:txBody>
+          <a:bodyPr/>
+          <a:lstStyle/>
+          <a:p>
+            <a:r>
+              <a:rPr lang="en-US" b="1" dirty="0" smtClean="0"/>
+              <a:t>What is </a:t>
+            </a:r>
+            <a:r>
+              <a:rPr lang="en-US" b="1" dirty="0" err="1" smtClean="0"/>
+              <a:t>SignalR</a:t>
+            </a:r>
+            <a:r>
+              <a:rPr lang="en-US" b="1" dirty="0" smtClean="0"/>
+              <a:t>?</a:t>
+            </a:r>
+            <a:endParaRPr lang="en-US" b="1" dirty="0"/>
+          </a:p>
+        </p:txBody>
+      </p:sp>
+      <p:sp>
+        <p:nvSpPr>
+          <p:cNvPr id="3" name="Content Placeholder 2"/>
+          <p:cNvSpPr>
+            <a:spLocks noGrp="1"/>
+          </p:cNvSpPr>
+          <p:nvPr>
+            <p:ph idx="1"/>
+          </p:nvPr>
+        </p:nvSpPr>
+        <p:spPr>
+          <a:xfrm>
+            <a:off x="366714" y="2283210"/>
             <a:ext cx="8410575" cy="769441"/>
           </a:xfrm>
         </p:spPr>
@@ -7569,13 +8409,117 @@
             </a:pPr>
             <a:r>
               <a:rPr lang="en-US" sz="4800" b="1" dirty="0" smtClean="0"/>
-              <a:t>Questions?</a:t>
+              <a:t>To the whiteboard!</a:t>
             </a:r>
             <a:endParaRPr lang="en-US" sz="2800" b="1" dirty="0" smtClean="0"/>
           </a:p>
         </p:txBody>
       </p:sp>
     </p:spTree>
+    <p:extLst>
+      <p:ext uri="{BB962C8B-B14F-4D97-AF65-F5344CB8AC3E}">
+        <p14:creationId xmlns:p14="http://schemas.microsoft.com/office/powerpoint/2010/main" val="955297497"/>
+      </p:ext>
+    </p:extLst>
+  </p:cSld>
+  <p:clrMapOvr>
+    <a:masterClrMapping/>
+  </p:clrMapOvr>
+  <p:transition>
+    <p:fade/>
+  </p:transition>
+  <p:timing>
+    <p:tnLst>
+      <p:par>
+        <p:cTn id="1" dur="indefinite" restart="never" nodeType="tmRoot"/>
+      </p:par>
+    </p:tnLst>
+  </p:timing>
+</p:sld>
+</file>
+
+<file path=ppt/slides/slide9.xml><?xml version="1.0" encoding="utf-8"?>
+<p:sld xmlns:a="http://schemas.openxmlformats.org/drawingml/2006/main" xmlns:r="http://schemas.openxmlformats.org/officeDocument/2006/relationships" xmlns:p="http://schemas.openxmlformats.org/presentationml/2006/main">
+  <p:cSld>
+    <p:spTree>
+      <p:nvGrpSpPr>
+        <p:cNvPr id="1" name=""/>
+        <p:cNvGrpSpPr/>
+        <p:nvPr/>
+      </p:nvGrpSpPr>
+      <p:grpSpPr>
+        <a:xfrm>
+          <a:off x="0" y="0"/>
+          <a:ext cx="0" cy="0"/>
+          <a:chOff x="0" y="0"/>
+          <a:chExt cx="0" cy="0"/>
+        </a:xfrm>
+      </p:grpSpPr>
+      <p:sp>
+        <p:nvSpPr>
+          <p:cNvPr id="2" name="Title 1"/>
+          <p:cNvSpPr>
+            <a:spLocks noGrp="1"/>
+          </p:cNvSpPr>
+          <p:nvPr>
+            <p:ph type="title"/>
+          </p:nvPr>
+        </p:nvSpPr>
+        <p:spPr>
+          <a:xfrm>
+            <a:off x="381000" y="171450"/>
+            <a:ext cx="8382000" cy="769441"/>
+          </a:xfrm>
+        </p:spPr>
+        <p:txBody>
+          <a:bodyPr/>
+          <a:lstStyle/>
+          <a:p>
+            <a:r>
+              <a:rPr lang="en-US" b="1" dirty="0" smtClean="0"/>
+              <a:t>Demo</a:t>
+            </a:r>
+            <a:endParaRPr lang="en-US" b="1" dirty="0"/>
+          </a:p>
+        </p:txBody>
+      </p:sp>
+      <p:sp>
+        <p:nvSpPr>
+          <p:cNvPr id="3" name="Content Placeholder 2"/>
+          <p:cNvSpPr>
+            <a:spLocks noGrp="1"/>
+          </p:cNvSpPr>
+          <p:nvPr>
+            <p:ph idx="1"/>
+          </p:nvPr>
+        </p:nvSpPr>
+        <p:spPr>
+          <a:xfrm>
+            <a:off x="366714" y="2283210"/>
+            <a:ext cx="8410575" cy="769441"/>
+          </a:xfrm>
+        </p:spPr>
+        <p:txBody>
+          <a:bodyPr/>
+          <a:lstStyle/>
+          <a:p>
+            <a:pPr algn="ctr">
+              <a:buNone/>
+            </a:pPr>
+            <a:r>
+              <a:rPr lang="en-US" sz="4800" b="1" dirty="0" smtClean="0"/>
+              <a:t>Enough slides, let’s code.</a:t>
+            </a:r>
+            <a:endParaRPr lang="en-US" sz="2800" b="1" dirty="0" smtClean="0"/>
+          </a:p>
+        </p:txBody>
+      </p:sp>
+    </p:spTree>
+    <p:extLst>
+      <p:ext uri="{BB962C8B-B14F-4D97-AF65-F5344CB8AC3E}">
+        <p14:creationId xmlns:p14="http://schemas.microsoft.com/office/powerpoint/2010/main" val="2921785292"/>
+      </p:ext>
+    </p:extLst>
   </p:cSld>
   <p:clrMapOvr>
     <a:masterClrMapping/>

</xml_diff>